<commit_message>
adding repo to ppt
</commit_message>
<xml_diff>
--- a/MICRO-FRONTEND.pptx
+++ b/MICRO-FRONTEND.pptx
@@ -10010,6 +10010,40 @@
             <a:pPr algn="ctr"/>
             <a:r>
               <a:rPr lang="en-US" sz="4000" dirty="0"/>
+              <a:t>Material link: </a:t>
+            </a:r>
+            <a:br>
+              <a:rPr lang="en-US" sz="4000" dirty="0"/>
+            </a:br>
+            <a:r>
+              <a:rPr lang="en-US" sz="2400" dirty="0" err="1">
+                <a:hlinkClick r:id="rId2"/>
+              </a:rPr>
+              <a:t>babakzarrinbal</a:t>
+            </a:r>
+            <a:r>
+              <a:rPr lang="en-US" sz="2400" dirty="0">
+                <a:hlinkClick r:id="rId2"/>
+              </a:rPr>
+              <a:t>/</a:t>
+            </a:r>
+            <a:r>
+              <a:rPr lang="en-US" sz="2400" dirty="0" err="1">
+                <a:hlinkClick r:id="rId2"/>
+              </a:rPr>
+              <a:t>mirco</a:t>
+            </a:r>
+            <a:r>
+              <a:rPr lang="en-US" sz="2400" dirty="0">
+                <a:hlinkClick r:id="rId2"/>
+              </a:rPr>
+              <a:t>-front-end (github.com)</a:t>
+            </a:r>
+            <a:br>
+              <a:rPr lang="en-US" sz="4000" dirty="0"/>
+            </a:br>
+            <a:r>
+              <a:rPr lang="en-US" sz="4000" dirty="0"/>
               <a:t>Thank you and have fun changing the world </a:t>
             </a:r>
           </a:p>
@@ -10030,14 +10064,14 @@
           <p:nvPr/>
         </p:nvPicPr>
         <p:blipFill>
-          <a:blip r:embed="rId2"/>
+          <a:blip r:embed="rId3"/>
           <a:stretch>
             <a:fillRect/>
           </a:stretch>
         </p:blipFill>
         <p:spPr>
           <a:xfrm>
-            <a:off x="4795837" y="2908712"/>
+            <a:off x="4314574" y="3520604"/>
             <a:ext cx="2600325" cy="2857500"/>
           </a:xfrm>
           <a:prstGeom prst="rect">

</xml_diff>

<commit_message>
adding readme to folders
</commit_message>
<xml_diff>
--- a/MICRO-FRONTEND.pptx
+++ b/MICRO-FRONTEND.pptx
@@ -8187,7 +8187,7 @@
         <p:spPr>
           <a:xfrm>
             <a:off x="685801" y="1708930"/>
-            <a:ext cx="4326211" cy="3649133"/>
+            <a:ext cx="10472737" cy="3649133"/>
           </a:xfrm>
         </p:spPr>
         <p:txBody>
@@ -8196,33 +8196,42 @@
           </a:bodyPr>
           <a:lstStyle/>
           <a:p>
+            <a:pPr marL="0" indent="0">
+              <a:buNone/>
+            </a:pPr>
             <a:r>
               <a:rPr lang="en-US" dirty="0"/>
               <a:t>container app: </a:t>
             </a:r>
           </a:p>
           <a:p>
-            <a:r>
-              <a:rPr lang="en-US" dirty="0"/>
-              <a:t> - Routing navigations</a:t>
-            </a:r>
-          </a:p>
-          <a:p>
-            <a:r>
-              <a:rPr lang="en-US" dirty="0"/>
-              <a:t> - Navigation Menu (on the top/left to switch between different app)</a:t>
-            </a:r>
-          </a:p>
-          <a:p>
-            <a:r>
-              <a:rPr lang="en-US" dirty="0"/>
-              <a:t> - showing level1 apps based on navigation</a:t>
-            </a:r>
-          </a:p>
-          <a:p>
-            <a:r>
-              <a:rPr lang="en-US" dirty="0"/>
-              <a:t> - holding user tokens to pass to </a:t>
+            <a:pPr marL="0" indent="0">
+              <a:buNone/>
+            </a:pPr>
+            <a:endParaRPr lang="en-US" dirty="0"/>
+          </a:p>
+          <a:p>
+            <a:r>
+              <a:rPr lang="en-US" dirty="0"/>
+              <a:t>  Routing navigations</a:t>
+            </a:r>
+          </a:p>
+          <a:p>
+            <a:r>
+              <a:rPr lang="en-US" dirty="0"/>
+              <a:t> Navigation Menu (on the top/left to switch between different app)</a:t>
+            </a:r>
+          </a:p>
+          <a:p>
+            <a:r>
+              <a:rPr lang="en-US" dirty="0"/>
+              <a:t> showing level1 apps based on navigation</a:t>
+            </a:r>
+          </a:p>
+          <a:p>
+            <a:r>
+              <a:rPr lang="en-US" dirty="0"/>
+              <a:t> holding user tokens to pass to </a:t>
             </a:r>
             <a:r>
               <a:rPr lang="en-US" dirty="0" err="1"/>
@@ -8233,13 +8242,13 @@
           <a:p>
             <a:r>
               <a:rPr lang="en-US" dirty="0"/>
-              <a:t> - keeping current user information</a:t>
-            </a:r>
-          </a:p>
-          <a:p>
-            <a:r>
-              <a:rPr lang="en-US" dirty="0"/>
-              <a:t> - permission checks for different apps</a:t>
+              <a:t> keeping current user information</a:t>
+            </a:r>
+          </a:p>
+          <a:p>
+            <a:r>
+              <a:rPr lang="en-US" dirty="0"/>
+              <a:t> permission checks for different apps</a:t>
             </a:r>
           </a:p>
         </p:txBody>
@@ -9420,7 +9429,7 @@
                 <a:ea typeface="+mn-ea"/>
                 <a:cs typeface="+mn-cs"/>
               </a:rPr>
-              <a:t>-merchant space app</a:t>
+              <a:t>merchant space app</a:t>
             </a:r>
             <a:endParaRPr lang="en-US" dirty="0">
               <a:effectLst/>

</xml_diff>